<commit_message>
Update 24 Jan 2021
</commit_message>
<xml_diff>
--- a/TC/015 - Ngày Ngày Ngợi Danh Chúa Hiển Vinh.pptx
+++ b/TC/015 - Ngày Ngày Ngợi Danh Chúa Hiển Vinh.pptx
@@ -167,10 +167,9 @@
           </a:lstStyle>
           <a:p>
             <a:r>
-              <a:rPr lang="en-US" smtClean="0"/>
+              <a:rPr lang="en-US"/>
               <a:t>Click to edit Master title style</a:t>
             </a:r>
-            <a:endParaRPr lang="en-US"/>
           </a:p>
         </p:txBody>
       </p:sp>
@@ -232,10 +231,9 @@
           </a:lstStyle>
           <a:p>
             <a:r>
-              <a:rPr lang="en-US" smtClean="0"/>
+              <a:rPr lang="en-US"/>
               <a:t>Click to edit Master subtitle style</a:t>
             </a:r>
-            <a:endParaRPr lang="en-US"/>
           </a:p>
         </p:txBody>
       </p:sp>
@@ -256,7 +254,7 @@
           <a:p>
             <a:fld id="{21EE17E9-7ACD-4AD4-8D41-070106C7D3E3}" type="datetimeFigureOut">
               <a:rPr lang="en-US" smtClean="0"/>
-              <a:t>18/11/2013</a:t>
+              <a:t>Sun, 1/17/2021</a:t>
             </a:fld>
             <a:endParaRPr lang="en-US"/>
           </a:p>
@@ -359,10 +357,9 @@
           </a:lstStyle>
           <a:p>
             <a:r>
-              <a:rPr lang="en-US" smtClean="0"/>
+              <a:rPr lang="en-US"/>
               <a:t>Click to edit Master title style</a:t>
             </a:r>
-            <a:endParaRPr lang="en-US"/>
           </a:p>
         </p:txBody>
       </p:sp>
@@ -424,10 +421,9 @@
           </a:lstStyle>
           <a:p>
             <a:r>
-              <a:rPr lang="en-US" smtClean="0"/>
+              <a:rPr lang="en-US"/>
               <a:t>Click to edit Master subtitle style</a:t>
             </a:r>
-            <a:endParaRPr lang="en-US"/>
           </a:p>
         </p:txBody>
       </p:sp>
@@ -448,7 +444,7 @@
           <a:p>
             <a:fld id="{21EE17E9-7ACD-4AD4-8D41-070106C7D3E3}" type="datetimeFigureOut">
               <a:rPr lang="en-US" smtClean="0"/>
-              <a:t>18/11/2013</a:t>
+              <a:t>Sun, 1/17/2021</a:t>
             </a:fld>
             <a:endParaRPr lang="en-US"/>
           </a:p>
@@ -566,10 +562,9 @@
           <a:lstStyle/>
           <a:p>
             <a:r>
-              <a:rPr lang="en-US" smtClean="0"/>
+              <a:rPr lang="en-US"/>
               <a:t>Click to edit Master title style</a:t>
             </a:r>
-            <a:endParaRPr lang="en-US"/>
           </a:p>
         </p:txBody>
       </p:sp>
@@ -600,38 +595,37 @@
           <a:p>
             <a:pPr lvl="0"/>
             <a:r>
-              <a:rPr lang="en-US" smtClean="0"/>
+              <a:rPr lang="en-US"/>
               <a:t>Click to edit Master text styles</a:t>
             </a:r>
           </a:p>
           <a:p>
             <a:pPr lvl="1"/>
             <a:r>
-              <a:rPr lang="en-US" smtClean="0"/>
+              <a:rPr lang="en-US"/>
               <a:t>Second level</a:t>
             </a:r>
           </a:p>
           <a:p>
             <a:pPr lvl="2"/>
             <a:r>
-              <a:rPr lang="en-US" smtClean="0"/>
+              <a:rPr lang="en-US"/>
               <a:t>Third level</a:t>
             </a:r>
           </a:p>
           <a:p>
             <a:pPr lvl="3"/>
             <a:r>
-              <a:rPr lang="en-US" smtClean="0"/>
+              <a:rPr lang="en-US"/>
               <a:t>Fourth level</a:t>
             </a:r>
           </a:p>
           <a:p>
             <a:pPr lvl="4"/>
             <a:r>
-              <a:rPr lang="en-US" smtClean="0"/>
+              <a:rPr lang="en-US"/>
               <a:t>Fifth level</a:t>
             </a:r>
-            <a:endParaRPr lang="en-US"/>
           </a:p>
         </p:txBody>
       </p:sp>
@@ -670,7 +664,7 @@
           <a:p>
             <a:fld id="{21EE17E9-7ACD-4AD4-8D41-070106C7D3E3}" type="datetimeFigureOut">
               <a:rPr lang="en-US" smtClean="0"/>
-              <a:t>18/11/2013</a:t>
+              <a:t>Sun, 1/17/2021</a:t>
             </a:fld>
             <a:endParaRPr lang="en-US"/>
           </a:p>
@@ -1105,10 +1099,9 @@
           <a:lstStyle/>
           <a:p>
             <a:r>
-              <a:rPr lang="en-US" smtClean="0"/>
+              <a:rPr lang="en-US"/>
               <a:t>Click to edit Master title style</a:t>
             </a:r>
-            <a:endParaRPr lang="en-US"/>
           </a:p>
         </p:txBody>
       </p:sp>
@@ -1139,38 +1132,37 @@
           <a:p>
             <a:pPr lvl="0"/>
             <a:r>
-              <a:rPr lang="en-US" smtClean="0"/>
+              <a:rPr lang="en-US"/>
               <a:t>Click to edit Master text styles</a:t>
             </a:r>
           </a:p>
           <a:p>
             <a:pPr lvl="1"/>
             <a:r>
-              <a:rPr lang="en-US" smtClean="0"/>
+              <a:rPr lang="en-US"/>
               <a:t>Second level</a:t>
             </a:r>
           </a:p>
           <a:p>
             <a:pPr lvl="2"/>
             <a:r>
-              <a:rPr lang="en-US" smtClean="0"/>
+              <a:rPr lang="en-US"/>
               <a:t>Third level</a:t>
             </a:r>
           </a:p>
           <a:p>
             <a:pPr lvl="3"/>
             <a:r>
-              <a:rPr lang="en-US" smtClean="0"/>
+              <a:rPr lang="en-US"/>
               <a:t>Fourth level</a:t>
             </a:r>
           </a:p>
           <a:p>
             <a:pPr lvl="4"/>
             <a:r>
-              <a:rPr lang="en-US" smtClean="0"/>
+              <a:rPr lang="en-US"/>
               <a:t>Fifth level</a:t>
             </a:r>
-            <a:endParaRPr lang="en-US"/>
           </a:p>
         </p:txBody>
       </p:sp>
@@ -1209,7 +1201,7 @@
           <a:p>
             <a:fld id="{21EE17E9-7ACD-4AD4-8D41-070106C7D3E3}" type="datetimeFigureOut">
               <a:rPr lang="en-US" smtClean="0"/>
-              <a:t>18/11/2013</a:t>
+              <a:t>Sun, 1/17/2021</a:t>
             </a:fld>
             <a:endParaRPr lang="en-US"/>
           </a:p>
@@ -1717,25 +1709,18 @@
   <p:clrMapOvr>
     <a:masterClrMapping/>
   </p:clrMapOvr>
-  <mc:AlternateContent xmlns:mc="http://schemas.openxmlformats.org/markup-compatibility/2006">
-    <mc:Choice xmlns:p14="http://schemas.microsoft.com/office/powerpoint/2010/main" Requires="p14">
+  <mc:AlternateContent xmlns:mc="http://schemas.openxmlformats.org/markup-compatibility/2006" xmlns:p14="http://schemas.microsoft.com/office/powerpoint/2010/main">
+    <mc:Choice Requires="p14">
       <p:transition spd="slow" p14:dur="800">
         <p:circle/>
       </p:transition>
     </mc:Choice>
-    <mc:Fallback>
+    <mc:Fallback xmlns="">
       <p:transition spd="slow">
         <p:circle/>
       </p:transition>
     </mc:Fallback>
   </mc:AlternateContent>
-  <p:timing>
-    <p:tnLst>
-      <p:par>
-        <p:cTn id="1" dur="indefinite" restart="never" nodeType="tmRoot"/>
-      </p:par>
-    </p:tnLst>
-  </p:timing>
 </p:sld>
 </file>
 
@@ -1857,10 +1842,83 @@
           </a:lstStyle>
           <a:p>
             <a:r>
-              <a:rPr lang="en-US" smtClean="0"/>
-              <a:t>TC 15 – Ngaøy Ngaøy Ngôïi Danh Chuùa Hieån Vinh</a:t>
-            </a:r>
-            <a:endParaRPr lang="en-US"/>
+              <a:rPr lang="en-US" dirty="0">
+                <a:latin typeface="VNI-Times" pitchFamily="2" charset="0"/>
+              </a:rPr>
+              <a:t>TC 15 – </a:t>
+            </a:r>
+            <a:r>
+              <a:rPr lang="en-US" dirty="0" err="1">
+                <a:latin typeface="VNI-Times" pitchFamily="2" charset="0"/>
+              </a:rPr>
+              <a:t>Ngaøy</a:t>
+            </a:r>
+            <a:r>
+              <a:rPr lang="en-US" dirty="0">
+                <a:latin typeface="VNI-Times" pitchFamily="2" charset="0"/>
+              </a:rPr>
+              <a:t> </a:t>
+            </a:r>
+            <a:r>
+              <a:rPr lang="en-US" dirty="0" err="1">
+                <a:latin typeface="VNI-Times" pitchFamily="2" charset="0"/>
+              </a:rPr>
+              <a:t>Ngaøy</a:t>
+            </a:r>
+            <a:r>
+              <a:rPr lang="en-US" dirty="0">
+                <a:latin typeface="VNI-Times" pitchFamily="2" charset="0"/>
+              </a:rPr>
+              <a:t> </a:t>
+            </a:r>
+            <a:r>
+              <a:rPr lang="en-US" dirty="0" err="1">
+                <a:latin typeface="VNI-Times" pitchFamily="2" charset="0"/>
+              </a:rPr>
+              <a:t>Ngôïi</a:t>
+            </a:r>
+            <a:r>
+              <a:rPr lang="en-US" dirty="0">
+                <a:latin typeface="VNI-Times" pitchFamily="2" charset="0"/>
+              </a:rPr>
+              <a:t> </a:t>
+            </a:r>
+            <a:r>
+              <a:rPr lang="en-US" dirty="0" err="1">
+                <a:latin typeface="VNI-Times" pitchFamily="2" charset="0"/>
+              </a:rPr>
+              <a:t>Danh</a:t>
+            </a:r>
+            <a:r>
+              <a:rPr lang="en-US" dirty="0">
+                <a:latin typeface="VNI-Times" pitchFamily="2" charset="0"/>
+              </a:rPr>
+              <a:t> </a:t>
+            </a:r>
+            <a:r>
+              <a:rPr lang="en-US" dirty="0" err="1">
+                <a:latin typeface="VNI-Times" pitchFamily="2" charset="0"/>
+              </a:rPr>
+              <a:t>Chuùa</a:t>
+            </a:r>
+            <a:r>
+              <a:rPr lang="en-US" dirty="0">
+                <a:latin typeface="VNI-Times" pitchFamily="2" charset="0"/>
+              </a:rPr>
+              <a:t> </a:t>
+            </a:r>
+            <a:r>
+              <a:rPr lang="en-US" dirty="0" err="1">
+                <a:latin typeface="VNI-Times" pitchFamily="2" charset="0"/>
+              </a:rPr>
+              <a:t>Hieån</a:t>
+            </a:r>
+            <a:r>
+              <a:rPr lang="en-US" dirty="0">
+                <a:latin typeface="VNI-Times" pitchFamily="2" charset="0"/>
+              </a:rPr>
+              <a:t> Vinh</a:t>
+            </a:r>
           </a:p>
         </p:txBody>
       </p:sp>
@@ -1886,13 +1944,6 @@
       </p:transition>
     </mc:Fallback>
   </mc:AlternateContent>
-  <p:timing>
-    <p:tnLst>
-      <p:par>
-        <p:cTn id="1" dur="indefinite" restart="never" nodeType="tmRoot"/>
-      </p:par>
-    </p:tnLst>
-  </p:timing>
 </p:sld>
 </file>
 
@@ -2010,10 +2061,83 @@
           </a:lstStyle>
           <a:p>
             <a:r>
-              <a:rPr lang="en-US" smtClean="0"/>
-              <a:t>TC 15 – Ngaøy Ngaøy Ngôïi Danh Chuùa Hieån Vinh</a:t>
-            </a:r>
-            <a:endParaRPr lang="en-US"/>
+              <a:rPr lang="en-US" dirty="0">
+                <a:latin typeface="VNI-Times" pitchFamily="2" charset="0"/>
+              </a:rPr>
+              <a:t>TC 15 – </a:t>
+            </a:r>
+            <a:r>
+              <a:rPr lang="en-US" dirty="0" err="1">
+                <a:latin typeface="VNI-Times" pitchFamily="2" charset="0"/>
+              </a:rPr>
+              <a:t>Ngaøy</a:t>
+            </a:r>
+            <a:r>
+              <a:rPr lang="en-US" dirty="0">
+                <a:latin typeface="VNI-Times" pitchFamily="2" charset="0"/>
+              </a:rPr>
+              <a:t> </a:t>
+            </a:r>
+            <a:r>
+              <a:rPr lang="en-US" dirty="0" err="1">
+                <a:latin typeface="VNI-Times" pitchFamily="2" charset="0"/>
+              </a:rPr>
+              <a:t>Ngaøy</a:t>
+            </a:r>
+            <a:r>
+              <a:rPr lang="en-US" dirty="0">
+                <a:latin typeface="VNI-Times" pitchFamily="2" charset="0"/>
+              </a:rPr>
+              <a:t> </a:t>
+            </a:r>
+            <a:r>
+              <a:rPr lang="en-US" dirty="0" err="1">
+                <a:latin typeface="VNI-Times" pitchFamily="2" charset="0"/>
+              </a:rPr>
+              <a:t>Ngôïi</a:t>
+            </a:r>
+            <a:r>
+              <a:rPr lang="en-US" dirty="0">
+                <a:latin typeface="VNI-Times" pitchFamily="2" charset="0"/>
+              </a:rPr>
+              <a:t> </a:t>
+            </a:r>
+            <a:r>
+              <a:rPr lang="en-US" dirty="0" err="1">
+                <a:latin typeface="VNI-Times" pitchFamily="2" charset="0"/>
+              </a:rPr>
+              <a:t>Danh</a:t>
+            </a:r>
+            <a:r>
+              <a:rPr lang="en-US" dirty="0">
+                <a:latin typeface="VNI-Times" pitchFamily="2" charset="0"/>
+              </a:rPr>
+              <a:t> </a:t>
+            </a:r>
+            <a:r>
+              <a:rPr lang="en-US" dirty="0" err="1">
+                <a:latin typeface="VNI-Times" pitchFamily="2" charset="0"/>
+              </a:rPr>
+              <a:t>Chuùa</a:t>
+            </a:r>
+            <a:r>
+              <a:rPr lang="en-US" dirty="0">
+                <a:latin typeface="VNI-Times" pitchFamily="2" charset="0"/>
+              </a:rPr>
+              <a:t> </a:t>
+            </a:r>
+            <a:r>
+              <a:rPr lang="en-US" dirty="0" err="1">
+                <a:latin typeface="VNI-Times" pitchFamily="2" charset="0"/>
+              </a:rPr>
+              <a:t>Hieån</a:t>
+            </a:r>
+            <a:r>
+              <a:rPr lang="en-US" dirty="0">
+                <a:latin typeface="VNI-Times" pitchFamily="2" charset="0"/>
+              </a:rPr>
+              <a:t> Vinh</a:t>
+            </a:r>
           </a:p>
         </p:txBody>
       </p:sp>
@@ -2027,21 +2151,6 @@
   <p:clrMapOvr>
     <a:masterClrMapping/>
   </p:clrMapOvr>
-  <mc:AlternateContent xmlns:mc="http://schemas.openxmlformats.org/markup-compatibility/2006" xmlns:p14="http://schemas.microsoft.com/office/powerpoint/2010/main">
-    <mc:Choice Requires="p14">
-      <p:transition p14:dur="0"/>
-    </mc:Choice>
-    <mc:Fallback xmlns="">
-      <p:transition/>
-    </mc:Fallback>
-  </mc:AlternateContent>
-  <p:timing>
-    <p:tnLst>
-      <p:par>
-        <p:cTn id="1" dur="indefinite" restart="never" nodeType="tmRoot"/>
-      </p:par>
-    </p:tnLst>
-  </p:timing>
 </p:sld>
 </file>
 
@@ -2177,10 +2286,83 @@
           </a:lstStyle>
           <a:p>
             <a:r>
-              <a:rPr lang="en-US" smtClean="0"/>
-              <a:t>TC 15 – Ngaøy Ngaøy Ngôïi Danh Chuùa Hieån Vinh</a:t>
-            </a:r>
-            <a:endParaRPr lang="en-US"/>
+              <a:rPr lang="en-US" dirty="0">
+                <a:latin typeface="VNI-Times" pitchFamily="2" charset="0"/>
+              </a:rPr>
+              <a:t>TC 15 – </a:t>
+            </a:r>
+            <a:r>
+              <a:rPr lang="en-US" dirty="0" err="1">
+                <a:latin typeface="VNI-Times" pitchFamily="2" charset="0"/>
+              </a:rPr>
+              <a:t>Ngaøy</a:t>
+            </a:r>
+            <a:r>
+              <a:rPr lang="en-US" dirty="0">
+                <a:latin typeface="VNI-Times" pitchFamily="2" charset="0"/>
+              </a:rPr>
+              <a:t> </a:t>
+            </a:r>
+            <a:r>
+              <a:rPr lang="en-US" dirty="0" err="1">
+                <a:latin typeface="VNI-Times" pitchFamily="2" charset="0"/>
+              </a:rPr>
+              <a:t>Ngaøy</a:t>
+            </a:r>
+            <a:r>
+              <a:rPr lang="en-US" dirty="0">
+                <a:latin typeface="VNI-Times" pitchFamily="2" charset="0"/>
+              </a:rPr>
+              <a:t> </a:t>
+            </a:r>
+            <a:r>
+              <a:rPr lang="en-US" dirty="0" err="1">
+                <a:latin typeface="VNI-Times" pitchFamily="2" charset="0"/>
+              </a:rPr>
+              <a:t>Ngôïi</a:t>
+            </a:r>
+            <a:r>
+              <a:rPr lang="en-US" dirty="0">
+                <a:latin typeface="VNI-Times" pitchFamily="2" charset="0"/>
+              </a:rPr>
+              <a:t> </a:t>
+            </a:r>
+            <a:r>
+              <a:rPr lang="en-US" dirty="0" err="1">
+                <a:latin typeface="VNI-Times" pitchFamily="2" charset="0"/>
+              </a:rPr>
+              <a:t>Danh</a:t>
+            </a:r>
+            <a:r>
+              <a:rPr lang="en-US" dirty="0">
+                <a:latin typeface="VNI-Times" pitchFamily="2" charset="0"/>
+              </a:rPr>
+              <a:t> </a:t>
+            </a:r>
+            <a:r>
+              <a:rPr lang="en-US" dirty="0" err="1">
+                <a:latin typeface="VNI-Times" pitchFamily="2" charset="0"/>
+              </a:rPr>
+              <a:t>Chuùa</a:t>
+            </a:r>
+            <a:r>
+              <a:rPr lang="en-US" dirty="0">
+                <a:latin typeface="VNI-Times" pitchFamily="2" charset="0"/>
+              </a:rPr>
+              <a:t> </a:t>
+            </a:r>
+            <a:r>
+              <a:rPr lang="en-US" dirty="0" err="1">
+                <a:latin typeface="VNI-Times" pitchFamily="2" charset="0"/>
+              </a:rPr>
+              <a:t>Hieån</a:t>
+            </a:r>
+            <a:r>
+              <a:rPr lang="en-US" dirty="0">
+                <a:latin typeface="VNI-Times" pitchFamily="2" charset="0"/>
+              </a:rPr>
+              <a:t> Vinh</a:t>
+            </a:r>
           </a:p>
         </p:txBody>
       </p:sp>
@@ -2194,21 +2376,6 @@
   <p:clrMapOvr>
     <a:masterClrMapping/>
   </p:clrMapOvr>
-  <mc:AlternateContent xmlns:mc="http://schemas.openxmlformats.org/markup-compatibility/2006" xmlns:p14="http://schemas.microsoft.com/office/powerpoint/2010/main">
-    <mc:Choice Requires="p14">
-      <p:transition p14:dur="0"/>
-    </mc:Choice>
-    <mc:Fallback xmlns="">
-      <p:transition/>
-    </mc:Fallback>
-  </mc:AlternateContent>
-  <p:timing>
-    <p:tnLst>
-      <p:par>
-        <p:cTn id="1" dur="indefinite" restart="never" nodeType="tmRoot"/>
-      </p:par>
-    </p:tnLst>
-  </p:timing>
 </p:sld>
 </file>
 
@@ -2340,10 +2507,83 @@
           </a:lstStyle>
           <a:p>
             <a:r>
-              <a:rPr lang="en-US" smtClean="0"/>
-              <a:t>TC 15 – Ngaøy Ngaøy Ngôïi Danh Chuùa Hieån Vinh</a:t>
-            </a:r>
-            <a:endParaRPr lang="en-US"/>
+              <a:rPr lang="en-US" dirty="0">
+                <a:latin typeface="VNI-Times" pitchFamily="2" charset="0"/>
+              </a:rPr>
+              <a:t>TC 15 – </a:t>
+            </a:r>
+            <a:r>
+              <a:rPr lang="en-US" dirty="0" err="1">
+                <a:latin typeface="VNI-Times" pitchFamily="2" charset="0"/>
+              </a:rPr>
+              <a:t>Ngaøy</a:t>
+            </a:r>
+            <a:r>
+              <a:rPr lang="en-US" dirty="0">
+                <a:latin typeface="VNI-Times" pitchFamily="2" charset="0"/>
+              </a:rPr>
+              <a:t> </a:t>
+            </a:r>
+            <a:r>
+              <a:rPr lang="en-US" dirty="0" err="1">
+                <a:latin typeface="VNI-Times" pitchFamily="2" charset="0"/>
+              </a:rPr>
+              <a:t>Ngaøy</a:t>
+            </a:r>
+            <a:r>
+              <a:rPr lang="en-US" dirty="0">
+                <a:latin typeface="VNI-Times" pitchFamily="2" charset="0"/>
+              </a:rPr>
+              <a:t> </a:t>
+            </a:r>
+            <a:r>
+              <a:rPr lang="en-US" dirty="0" err="1">
+                <a:latin typeface="VNI-Times" pitchFamily="2" charset="0"/>
+              </a:rPr>
+              <a:t>Ngôïi</a:t>
+            </a:r>
+            <a:r>
+              <a:rPr lang="en-US" dirty="0">
+                <a:latin typeface="VNI-Times" pitchFamily="2" charset="0"/>
+              </a:rPr>
+              <a:t> </a:t>
+            </a:r>
+            <a:r>
+              <a:rPr lang="en-US" dirty="0" err="1">
+                <a:latin typeface="VNI-Times" pitchFamily="2" charset="0"/>
+              </a:rPr>
+              <a:t>Danh</a:t>
+            </a:r>
+            <a:r>
+              <a:rPr lang="en-US" dirty="0">
+                <a:latin typeface="VNI-Times" pitchFamily="2" charset="0"/>
+              </a:rPr>
+              <a:t> </a:t>
+            </a:r>
+            <a:r>
+              <a:rPr lang="en-US" dirty="0" err="1">
+                <a:latin typeface="VNI-Times" pitchFamily="2" charset="0"/>
+              </a:rPr>
+              <a:t>Chuùa</a:t>
+            </a:r>
+            <a:r>
+              <a:rPr lang="en-US" dirty="0">
+                <a:latin typeface="VNI-Times" pitchFamily="2" charset="0"/>
+              </a:rPr>
+              <a:t> </a:t>
+            </a:r>
+            <a:r>
+              <a:rPr lang="en-US" dirty="0" err="1">
+                <a:latin typeface="VNI-Times" pitchFamily="2" charset="0"/>
+              </a:rPr>
+              <a:t>Hieån</a:t>
+            </a:r>
+            <a:r>
+              <a:rPr lang="en-US" dirty="0">
+                <a:latin typeface="VNI-Times" pitchFamily="2" charset="0"/>
+              </a:rPr>
+              <a:t> Vinh</a:t>
+            </a:r>
           </a:p>
         </p:txBody>
       </p:sp>
@@ -2357,21 +2597,6 @@
   <p:clrMapOvr>
     <a:masterClrMapping/>
   </p:clrMapOvr>
-  <mc:AlternateContent xmlns:mc="http://schemas.openxmlformats.org/markup-compatibility/2006" xmlns:p14="http://schemas.microsoft.com/office/powerpoint/2010/main">
-    <mc:Choice Requires="p14">
-      <p:transition p14:dur="0"/>
-    </mc:Choice>
-    <mc:Fallback xmlns="">
-      <p:transition/>
-    </mc:Fallback>
-  </mc:AlternateContent>
-  <p:timing>
-    <p:tnLst>
-      <p:par>
-        <p:cTn id="1" dur="indefinite" restart="never" nodeType="tmRoot"/>
-      </p:par>
-    </p:tnLst>
-  </p:timing>
 </p:sld>
 </file>
 
@@ -2507,10 +2732,83 @@
           </a:lstStyle>
           <a:p>
             <a:r>
-              <a:rPr lang="en-US" smtClean="0"/>
-              <a:t>TC 15 – Ngaøy Ngaøy Ngôïi Danh Chuùa Hieån Vinh</a:t>
-            </a:r>
-            <a:endParaRPr lang="en-US"/>
+              <a:rPr lang="en-US" dirty="0">
+                <a:latin typeface="VNI-Times" pitchFamily="2" charset="0"/>
+              </a:rPr>
+              <a:t>TC 15 – </a:t>
+            </a:r>
+            <a:r>
+              <a:rPr lang="en-US" dirty="0" err="1">
+                <a:latin typeface="VNI-Times" pitchFamily="2" charset="0"/>
+              </a:rPr>
+              <a:t>Ngaøy</a:t>
+            </a:r>
+            <a:r>
+              <a:rPr lang="en-US" dirty="0">
+                <a:latin typeface="VNI-Times" pitchFamily="2" charset="0"/>
+              </a:rPr>
+              <a:t> </a:t>
+            </a:r>
+            <a:r>
+              <a:rPr lang="en-US" dirty="0" err="1">
+                <a:latin typeface="VNI-Times" pitchFamily="2" charset="0"/>
+              </a:rPr>
+              <a:t>Ngaøy</a:t>
+            </a:r>
+            <a:r>
+              <a:rPr lang="en-US" dirty="0">
+                <a:latin typeface="VNI-Times" pitchFamily="2" charset="0"/>
+              </a:rPr>
+              <a:t> </a:t>
+            </a:r>
+            <a:r>
+              <a:rPr lang="en-US" dirty="0" err="1">
+                <a:latin typeface="VNI-Times" pitchFamily="2" charset="0"/>
+              </a:rPr>
+              <a:t>Ngôïi</a:t>
+            </a:r>
+            <a:r>
+              <a:rPr lang="en-US" dirty="0">
+                <a:latin typeface="VNI-Times" pitchFamily="2" charset="0"/>
+              </a:rPr>
+              <a:t> </a:t>
+            </a:r>
+            <a:r>
+              <a:rPr lang="en-US" dirty="0" err="1">
+                <a:latin typeface="VNI-Times" pitchFamily="2" charset="0"/>
+              </a:rPr>
+              <a:t>Danh</a:t>
+            </a:r>
+            <a:r>
+              <a:rPr lang="en-US" dirty="0">
+                <a:latin typeface="VNI-Times" pitchFamily="2" charset="0"/>
+              </a:rPr>
+              <a:t> </a:t>
+            </a:r>
+            <a:r>
+              <a:rPr lang="en-US" dirty="0" err="1">
+                <a:latin typeface="VNI-Times" pitchFamily="2" charset="0"/>
+              </a:rPr>
+              <a:t>Chuùa</a:t>
+            </a:r>
+            <a:r>
+              <a:rPr lang="en-US" dirty="0">
+                <a:latin typeface="VNI-Times" pitchFamily="2" charset="0"/>
+              </a:rPr>
+              <a:t> </a:t>
+            </a:r>
+            <a:r>
+              <a:rPr lang="en-US" dirty="0" err="1">
+                <a:latin typeface="VNI-Times" pitchFamily="2" charset="0"/>
+              </a:rPr>
+              <a:t>Hieån</a:t>
+            </a:r>
+            <a:r>
+              <a:rPr lang="en-US" dirty="0">
+                <a:latin typeface="VNI-Times" pitchFamily="2" charset="0"/>
+              </a:rPr>
+              <a:t> Vinh</a:t>
+            </a:r>
           </a:p>
         </p:txBody>
       </p:sp>
@@ -2527,13 +2825,6 @@
   <p:transition spd="slow">
     <p:randomBar dir="vert"/>
   </p:transition>
-  <p:timing>
-    <p:tnLst>
-      <p:par>
-        <p:cTn id="1" dur="indefinite" restart="never" nodeType="tmRoot"/>
-      </p:par>
-    </p:tnLst>
-  </p:timing>
 </p:sld>
 </file>
 
@@ -2665,10 +2956,83 @@
           </a:lstStyle>
           <a:p>
             <a:r>
-              <a:rPr lang="en-US" smtClean="0"/>
-              <a:t>TC 15 – Ngaøy Ngaøy Ngôïi Danh Chuùa Hieån Vinh</a:t>
-            </a:r>
-            <a:endParaRPr lang="en-US"/>
+              <a:rPr lang="en-US" dirty="0">
+                <a:latin typeface="VNI-Times" pitchFamily="2" charset="0"/>
+              </a:rPr>
+              <a:t>TC 15 – </a:t>
+            </a:r>
+            <a:r>
+              <a:rPr lang="en-US" dirty="0" err="1">
+                <a:latin typeface="VNI-Times" pitchFamily="2" charset="0"/>
+              </a:rPr>
+              <a:t>Ngaøy</a:t>
+            </a:r>
+            <a:r>
+              <a:rPr lang="en-US" dirty="0">
+                <a:latin typeface="VNI-Times" pitchFamily="2" charset="0"/>
+              </a:rPr>
+              <a:t> </a:t>
+            </a:r>
+            <a:r>
+              <a:rPr lang="en-US" dirty="0" err="1">
+                <a:latin typeface="VNI-Times" pitchFamily="2" charset="0"/>
+              </a:rPr>
+              <a:t>Ngaøy</a:t>
+            </a:r>
+            <a:r>
+              <a:rPr lang="en-US" dirty="0">
+                <a:latin typeface="VNI-Times" pitchFamily="2" charset="0"/>
+              </a:rPr>
+              <a:t> </a:t>
+            </a:r>
+            <a:r>
+              <a:rPr lang="en-US" dirty="0" err="1">
+                <a:latin typeface="VNI-Times" pitchFamily="2" charset="0"/>
+              </a:rPr>
+              <a:t>Ngôïi</a:t>
+            </a:r>
+            <a:r>
+              <a:rPr lang="en-US" dirty="0">
+                <a:latin typeface="VNI-Times" pitchFamily="2" charset="0"/>
+              </a:rPr>
+              <a:t> </a:t>
+            </a:r>
+            <a:r>
+              <a:rPr lang="en-US" dirty="0" err="1">
+                <a:latin typeface="VNI-Times" pitchFamily="2" charset="0"/>
+              </a:rPr>
+              <a:t>Danh</a:t>
+            </a:r>
+            <a:r>
+              <a:rPr lang="en-US" dirty="0">
+                <a:latin typeface="VNI-Times" pitchFamily="2" charset="0"/>
+              </a:rPr>
+              <a:t> </a:t>
+            </a:r>
+            <a:r>
+              <a:rPr lang="en-US" dirty="0" err="1">
+                <a:latin typeface="VNI-Times" pitchFamily="2" charset="0"/>
+              </a:rPr>
+              <a:t>Chuùa</a:t>
+            </a:r>
+            <a:r>
+              <a:rPr lang="en-US" dirty="0">
+                <a:latin typeface="VNI-Times" pitchFamily="2" charset="0"/>
+              </a:rPr>
+              <a:t> </a:t>
+            </a:r>
+            <a:r>
+              <a:rPr lang="en-US" dirty="0" err="1">
+                <a:latin typeface="VNI-Times" pitchFamily="2" charset="0"/>
+              </a:rPr>
+              <a:t>Hieån</a:t>
+            </a:r>
+            <a:r>
+              <a:rPr lang="en-US" dirty="0">
+                <a:latin typeface="VNI-Times" pitchFamily="2" charset="0"/>
+              </a:rPr>
+              <a:t> Vinh</a:t>
+            </a:r>
           </a:p>
         </p:txBody>
       </p:sp>
@@ -2682,21 +3046,6 @@
   <p:clrMapOvr>
     <a:masterClrMapping/>
   </p:clrMapOvr>
-  <mc:AlternateContent xmlns:mc="http://schemas.openxmlformats.org/markup-compatibility/2006" xmlns:p14="http://schemas.microsoft.com/office/powerpoint/2010/main">
-    <mc:Choice Requires="p14">
-      <p:transition p14:dur="0"/>
-    </mc:Choice>
-    <mc:Fallback xmlns="">
-      <p:transition/>
-    </mc:Fallback>
-  </mc:AlternateContent>
-  <p:timing>
-    <p:tnLst>
-      <p:par>
-        <p:cTn id="1" dur="indefinite" restart="never" nodeType="tmRoot"/>
-      </p:par>
-    </p:tnLst>
-  </p:timing>
 </p:sld>
 </file>
 
@@ -2832,10 +3181,83 @@
           </a:lstStyle>
           <a:p>
             <a:r>
-              <a:rPr lang="en-US" smtClean="0"/>
-              <a:t>TC 15 – Ngaøy Ngaøy Ngôïi Danh Chuùa Hieån Vinh</a:t>
-            </a:r>
-            <a:endParaRPr lang="en-US"/>
+              <a:rPr lang="en-US" dirty="0">
+                <a:latin typeface="VNI-Times" pitchFamily="2" charset="0"/>
+              </a:rPr>
+              <a:t>TC 15 – </a:t>
+            </a:r>
+            <a:r>
+              <a:rPr lang="en-US" dirty="0" err="1">
+                <a:latin typeface="VNI-Times" pitchFamily="2" charset="0"/>
+              </a:rPr>
+              <a:t>Ngaøy</a:t>
+            </a:r>
+            <a:r>
+              <a:rPr lang="en-US" dirty="0">
+                <a:latin typeface="VNI-Times" pitchFamily="2" charset="0"/>
+              </a:rPr>
+              <a:t> </a:t>
+            </a:r>
+            <a:r>
+              <a:rPr lang="en-US" dirty="0" err="1">
+                <a:latin typeface="VNI-Times" pitchFamily="2" charset="0"/>
+              </a:rPr>
+              <a:t>Ngaøy</a:t>
+            </a:r>
+            <a:r>
+              <a:rPr lang="en-US" dirty="0">
+                <a:latin typeface="VNI-Times" pitchFamily="2" charset="0"/>
+              </a:rPr>
+              <a:t> </a:t>
+            </a:r>
+            <a:r>
+              <a:rPr lang="en-US" dirty="0" err="1">
+                <a:latin typeface="VNI-Times" pitchFamily="2" charset="0"/>
+              </a:rPr>
+              <a:t>Ngôïi</a:t>
+            </a:r>
+            <a:r>
+              <a:rPr lang="en-US" dirty="0">
+                <a:latin typeface="VNI-Times" pitchFamily="2" charset="0"/>
+              </a:rPr>
+              <a:t> </a:t>
+            </a:r>
+            <a:r>
+              <a:rPr lang="en-US" dirty="0" err="1">
+                <a:latin typeface="VNI-Times" pitchFamily="2" charset="0"/>
+              </a:rPr>
+              <a:t>Danh</a:t>
+            </a:r>
+            <a:r>
+              <a:rPr lang="en-US" dirty="0">
+                <a:latin typeface="VNI-Times" pitchFamily="2" charset="0"/>
+              </a:rPr>
+              <a:t> </a:t>
+            </a:r>
+            <a:r>
+              <a:rPr lang="en-US" dirty="0" err="1">
+                <a:latin typeface="VNI-Times" pitchFamily="2" charset="0"/>
+              </a:rPr>
+              <a:t>Chuùa</a:t>
+            </a:r>
+            <a:r>
+              <a:rPr lang="en-US" dirty="0">
+                <a:latin typeface="VNI-Times" pitchFamily="2" charset="0"/>
+              </a:rPr>
+              <a:t> </a:t>
+            </a:r>
+            <a:r>
+              <a:rPr lang="en-US" dirty="0" err="1">
+                <a:latin typeface="VNI-Times" pitchFamily="2" charset="0"/>
+              </a:rPr>
+              <a:t>Hieån</a:t>
+            </a:r>
+            <a:r>
+              <a:rPr lang="en-US" dirty="0">
+                <a:latin typeface="VNI-Times" pitchFamily="2" charset="0"/>
+              </a:rPr>
+              <a:t> Vinh</a:t>
+            </a:r>
           </a:p>
         </p:txBody>
       </p:sp>
@@ -2849,21 +3271,6 @@
   <p:clrMapOvr>
     <a:masterClrMapping/>
   </p:clrMapOvr>
-  <mc:AlternateContent xmlns:mc="http://schemas.openxmlformats.org/markup-compatibility/2006" xmlns:p14="http://schemas.microsoft.com/office/powerpoint/2010/main">
-    <mc:Choice Requires="p14">
-      <p:transition p14:dur="0"/>
-    </mc:Choice>
-    <mc:Fallback xmlns="">
-      <p:transition/>
-    </mc:Fallback>
-  </mc:AlternateContent>
-  <p:timing>
-    <p:tnLst>
-      <p:par>
-        <p:cTn id="1" dur="indefinite" restart="never" nodeType="tmRoot"/>
-      </p:par>
-    </p:tnLst>
-  </p:timing>
 </p:sld>
 </file>
 
@@ -2995,10 +3402,83 @@
           </a:lstStyle>
           <a:p>
             <a:r>
-              <a:rPr lang="en-US" smtClean="0"/>
-              <a:t>TC 15 – Ngaøy Ngaøy Ngôïi Danh Chuùa Hieån Vinh</a:t>
-            </a:r>
-            <a:endParaRPr lang="en-US"/>
+              <a:rPr lang="en-US" dirty="0">
+                <a:latin typeface="VNI-Times" pitchFamily="2" charset="0"/>
+              </a:rPr>
+              <a:t>TC 15 – </a:t>
+            </a:r>
+            <a:r>
+              <a:rPr lang="en-US" dirty="0" err="1">
+                <a:latin typeface="VNI-Times" pitchFamily="2" charset="0"/>
+              </a:rPr>
+              <a:t>Ngaøy</a:t>
+            </a:r>
+            <a:r>
+              <a:rPr lang="en-US" dirty="0">
+                <a:latin typeface="VNI-Times" pitchFamily="2" charset="0"/>
+              </a:rPr>
+              <a:t> </a:t>
+            </a:r>
+            <a:r>
+              <a:rPr lang="en-US" dirty="0" err="1">
+                <a:latin typeface="VNI-Times" pitchFamily="2" charset="0"/>
+              </a:rPr>
+              <a:t>Ngaøy</a:t>
+            </a:r>
+            <a:r>
+              <a:rPr lang="en-US" dirty="0">
+                <a:latin typeface="VNI-Times" pitchFamily="2" charset="0"/>
+              </a:rPr>
+              <a:t> </a:t>
+            </a:r>
+            <a:r>
+              <a:rPr lang="en-US" dirty="0" err="1">
+                <a:latin typeface="VNI-Times" pitchFamily="2" charset="0"/>
+              </a:rPr>
+              <a:t>Ngôïi</a:t>
+            </a:r>
+            <a:r>
+              <a:rPr lang="en-US" dirty="0">
+                <a:latin typeface="VNI-Times" pitchFamily="2" charset="0"/>
+              </a:rPr>
+              <a:t> </a:t>
+            </a:r>
+            <a:r>
+              <a:rPr lang="en-US" dirty="0" err="1">
+                <a:latin typeface="VNI-Times" pitchFamily="2" charset="0"/>
+              </a:rPr>
+              <a:t>Danh</a:t>
+            </a:r>
+            <a:r>
+              <a:rPr lang="en-US" dirty="0">
+                <a:latin typeface="VNI-Times" pitchFamily="2" charset="0"/>
+              </a:rPr>
+              <a:t> </a:t>
+            </a:r>
+            <a:r>
+              <a:rPr lang="en-US" dirty="0" err="1">
+                <a:latin typeface="VNI-Times" pitchFamily="2" charset="0"/>
+              </a:rPr>
+              <a:t>Chuùa</a:t>
+            </a:r>
+            <a:r>
+              <a:rPr lang="en-US" dirty="0">
+                <a:latin typeface="VNI-Times" pitchFamily="2" charset="0"/>
+              </a:rPr>
+              <a:t> </a:t>
+            </a:r>
+            <a:r>
+              <a:rPr lang="en-US" dirty="0" err="1">
+                <a:latin typeface="VNI-Times" pitchFamily="2" charset="0"/>
+              </a:rPr>
+              <a:t>Hieån</a:t>
+            </a:r>
+            <a:r>
+              <a:rPr lang="en-US" dirty="0">
+                <a:latin typeface="VNI-Times" pitchFamily="2" charset="0"/>
+              </a:rPr>
+              <a:t> Vinh</a:t>
+            </a:r>
           </a:p>
         </p:txBody>
       </p:sp>
@@ -3012,21 +3492,6 @@
   <p:clrMapOvr>
     <a:masterClrMapping/>
   </p:clrMapOvr>
-  <mc:AlternateContent xmlns:mc="http://schemas.openxmlformats.org/markup-compatibility/2006" xmlns:p14="http://schemas.microsoft.com/office/powerpoint/2010/main">
-    <mc:Choice Requires="p14">
-      <p:transition p14:dur="0"/>
-    </mc:Choice>
-    <mc:Fallback xmlns="">
-      <p:transition/>
-    </mc:Fallback>
-  </mc:AlternateContent>
-  <p:timing>
-    <p:tnLst>
-      <p:par>
-        <p:cTn id="1" dur="indefinite" restart="never" nodeType="tmRoot"/>
-      </p:par>
-    </p:tnLst>
-  </p:timing>
 </p:sld>
 </file>
 
@@ -3162,10 +3627,83 @@
           </a:lstStyle>
           <a:p>
             <a:r>
-              <a:rPr lang="en-US" smtClean="0"/>
-              <a:t>TC 15 – Ngaøy Ngaøy Ngôïi Danh Chuùa Hieån Vinh</a:t>
-            </a:r>
-            <a:endParaRPr lang="en-US"/>
+              <a:rPr lang="en-US" dirty="0">
+                <a:latin typeface="VNI-Times" pitchFamily="2" charset="0"/>
+              </a:rPr>
+              <a:t>TC 15 – </a:t>
+            </a:r>
+            <a:r>
+              <a:rPr lang="en-US" dirty="0" err="1">
+                <a:latin typeface="VNI-Times" pitchFamily="2" charset="0"/>
+              </a:rPr>
+              <a:t>Ngaøy</a:t>
+            </a:r>
+            <a:r>
+              <a:rPr lang="en-US" dirty="0">
+                <a:latin typeface="VNI-Times" pitchFamily="2" charset="0"/>
+              </a:rPr>
+              <a:t> </a:t>
+            </a:r>
+            <a:r>
+              <a:rPr lang="en-US" dirty="0" err="1">
+                <a:latin typeface="VNI-Times" pitchFamily="2" charset="0"/>
+              </a:rPr>
+              <a:t>Ngaøy</a:t>
+            </a:r>
+            <a:r>
+              <a:rPr lang="en-US" dirty="0">
+                <a:latin typeface="VNI-Times" pitchFamily="2" charset="0"/>
+              </a:rPr>
+              <a:t> </a:t>
+            </a:r>
+            <a:r>
+              <a:rPr lang="en-US" dirty="0" err="1">
+                <a:latin typeface="VNI-Times" pitchFamily="2" charset="0"/>
+              </a:rPr>
+              <a:t>Ngôïi</a:t>
+            </a:r>
+            <a:r>
+              <a:rPr lang="en-US" dirty="0">
+                <a:latin typeface="VNI-Times" pitchFamily="2" charset="0"/>
+              </a:rPr>
+              <a:t> </a:t>
+            </a:r>
+            <a:r>
+              <a:rPr lang="en-US" dirty="0" err="1">
+                <a:latin typeface="VNI-Times" pitchFamily="2" charset="0"/>
+              </a:rPr>
+              <a:t>Danh</a:t>
+            </a:r>
+            <a:r>
+              <a:rPr lang="en-US" dirty="0">
+                <a:latin typeface="VNI-Times" pitchFamily="2" charset="0"/>
+              </a:rPr>
+              <a:t> </a:t>
+            </a:r>
+            <a:r>
+              <a:rPr lang="en-US" dirty="0" err="1">
+                <a:latin typeface="VNI-Times" pitchFamily="2" charset="0"/>
+              </a:rPr>
+              <a:t>Chuùa</a:t>
+            </a:r>
+            <a:r>
+              <a:rPr lang="en-US" dirty="0">
+                <a:latin typeface="VNI-Times" pitchFamily="2" charset="0"/>
+              </a:rPr>
+              <a:t> </a:t>
+            </a:r>
+            <a:r>
+              <a:rPr lang="en-US" dirty="0" err="1">
+                <a:latin typeface="VNI-Times" pitchFamily="2" charset="0"/>
+              </a:rPr>
+              <a:t>Hieån</a:t>
+            </a:r>
+            <a:r>
+              <a:rPr lang="en-US" dirty="0">
+                <a:latin typeface="VNI-Times" pitchFamily="2" charset="0"/>
+              </a:rPr>
+              <a:t> Vinh</a:t>
+            </a:r>
           </a:p>
         </p:txBody>
       </p:sp>
@@ -3179,21 +3717,6 @@
   <p:clrMapOvr>
     <a:masterClrMapping/>
   </p:clrMapOvr>
-  <mc:AlternateContent xmlns:mc="http://schemas.openxmlformats.org/markup-compatibility/2006" xmlns:p14="http://schemas.microsoft.com/office/powerpoint/2010/main">
-    <mc:Choice Requires="p14">
-      <p:transition p14:dur="0"/>
-    </mc:Choice>
-    <mc:Fallback xmlns="">
-      <p:transition/>
-    </mc:Fallback>
-  </mc:AlternateContent>
-  <p:timing>
-    <p:tnLst>
-      <p:par>
-        <p:cTn id="1" dur="indefinite" restart="never" nodeType="tmRoot"/>
-      </p:par>
-    </p:tnLst>
-  </p:timing>
 </p:sld>
 </file>
 
@@ -3311,10 +3834,83 @@
           </a:lstStyle>
           <a:p>
             <a:r>
-              <a:rPr lang="en-US" smtClean="0"/>
-              <a:t>TC 15 – Ngaøy Ngaøy Ngôïi Danh Chuùa Hieån Vinh</a:t>
-            </a:r>
-            <a:endParaRPr lang="en-US"/>
+              <a:rPr lang="en-US" dirty="0">
+                <a:latin typeface="VNI-Times" pitchFamily="2" charset="0"/>
+              </a:rPr>
+              <a:t>TC 15 – </a:t>
+            </a:r>
+            <a:r>
+              <a:rPr lang="en-US" dirty="0" err="1">
+                <a:latin typeface="VNI-Times" pitchFamily="2" charset="0"/>
+              </a:rPr>
+              <a:t>Ngaøy</a:t>
+            </a:r>
+            <a:r>
+              <a:rPr lang="en-US" dirty="0">
+                <a:latin typeface="VNI-Times" pitchFamily="2" charset="0"/>
+              </a:rPr>
+              <a:t> </a:t>
+            </a:r>
+            <a:r>
+              <a:rPr lang="en-US" dirty="0" err="1">
+                <a:latin typeface="VNI-Times" pitchFamily="2" charset="0"/>
+              </a:rPr>
+              <a:t>Ngaøy</a:t>
+            </a:r>
+            <a:r>
+              <a:rPr lang="en-US" dirty="0">
+                <a:latin typeface="VNI-Times" pitchFamily="2" charset="0"/>
+              </a:rPr>
+              <a:t> </a:t>
+            </a:r>
+            <a:r>
+              <a:rPr lang="en-US" dirty="0" err="1">
+                <a:latin typeface="VNI-Times" pitchFamily="2" charset="0"/>
+              </a:rPr>
+              <a:t>Ngôïi</a:t>
+            </a:r>
+            <a:r>
+              <a:rPr lang="en-US" dirty="0">
+                <a:latin typeface="VNI-Times" pitchFamily="2" charset="0"/>
+              </a:rPr>
+              <a:t> </a:t>
+            </a:r>
+            <a:r>
+              <a:rPr lang="en-US" dirty="0" err="1">
+                <a:latin typeface="VNI-Times" pitchFamily="2" charset="0"/>
+              </a:rPr>
+              <a:t>Danh</a:t>
+            </a:r>
+            <a:r>
+              <a:rPr lang="en-US" dirty="0">
+                <a:latin typeface="VNI-Times" pitchFamily="2" charset="0"/>
+              </a:rPr>
+              <a:t> </a:t>
+            </a:r>
+            <a:r>
+              <a:rPr lang="en-US" dirty="0" err="1">
+                <a:latin typeface="VNI-Times" pitchFamily="2" charset="0"/>
+              </a:rPr>
+              <a:t>Chuùa</a:t>
+            </a:r>
+            <a:r>
+              <a:rPr lang="en-US" dirty="0">
+                <a:latin typeface="VNI-Times" pitchFamily="2" charset="0"/>
+              </a:rPr>
+              <a:t> </a:t>
+            </a:r>
+            <a:r>
+              <a:rPr lang="en-US" dirty="0" err="1">
+                <a:latin typeface="VNI-Times" pitchFamily="2" charset="0"/>
+              </a:rPr>
+              <a:t>Hieån</a:t>
+            </a:r>
+            <a:r>
+              <a:rPr lang="en-US" dirty="0">
+                <a:latin typeface="VNI-Times" pitchFamily="2" charset="0"/>
+              </a:rPr>
+              <a:t> Vinh</a:t>
+            </a:r>
           </a:p>
         </p:txBody>
       </p:sp>
@@ -3328,21 +3924,6 @@
   <p:clrMapOvr>
     <a:masterClrMapping/>
   </p:clrMapOvr>
-  <mc:AlternateContent xmlns:mc="http://schemas.openxmlformats.org/markup-compatibility/2006" xmlns:p14="http://schemas.microsoft.com/office/powerpoint/2010/main">
-    <mc:Choice Requires="p14">
-      <p:transition p14:dur="0"/>
-    </mc:Choice>
-    <mc:Fallback xmlns="">
-      <p:transition/>
-    </mc:Fallback>
-  </mc:AlternateContent>
-  <p:timing>
-    <p:tnLst>
-      <p:par>
-        <p:cTn id="1" dur="indefinite" restart="never" nodeType="tmRoot"/>
-      </p:par>
-    </p:tnLst>
-  </p:timing>
 </p:sld>
 </file>
 
@@ -3478,10 +4059,83 @@
           </a:lstStyle>
           <a:p>
             <a:r>
-              <a:rPr lang="en-US" smtClean="0"/>
-              <a:t>TC 15 – Ngaøy Ngaøy Ngôïi Danh Chuùa Hieån Vinh</a:t>
-            </a:r>
-            <a:endParaRPr lang="en-US"/>
+              <a:rPr lang="en-US" dirty="0">
+                <a:latin typeface="VNI-Times" pitchFamily="2" charset="0"/>
+              </a:rPr>
+              <a:t>TC 15 – </a:t>
+            </a:r>
+            <a:r>
+              <a:rPr lang="en-US" dirty="0" err="1">
+                <a:latin typeface="VNI-Times" pitchFamily="2" charset="0"/>
+              </a:rPr>
+              <a:t>Ngaøy</a:t>
+            </a:r>
+            <a:r>
+              <a:rPr lang="en-US" dirty="0">
+                <a:latin typeface="VNI-Times" pitchFamily="2" charset="0"/>
+              </a:rPr>
+              <a:t> </a:t>
+            </a:r>
+            <a:r>
+              <a:rPr lang="en-US" dirty="0" err="1">
+                <a:latin typeface="VNI-Times" pitchFamily="2" charset="0"/>
+              </a:rPr>
+              <a:t>Ngaøy</a:t>
+            </a:r>
+            <a:r>
+              <a:rPr lang="en-US" dirty="0">
+                <a:latin typeface="VNI-Times" pitchFamily="2" charset="0"/>
+              </a:rPr>
+              <a:t> </a:t>
+            </a:r>
+            <a:r>
+              <a:rPr lang="en-US" dirty="0" err="1">
+                <a:latin typeface="VNI-Times" pitchFamily="2" charset="0"/>
+              </a:rPr>
+              <a:t>Ngôïi</a:t>
+            </a:r>
+            <a:r>
+              <a:rPr lang="en-US" dirty="0">
+                <a:latin typeface="VNI-Times" pitchFamily="2" charset="0"/>
+              </a:rPr>
+              <a:t> </a:t>
+            </a:r>
+            <a:r>
+              <a:rPr lang="en-US" dirty="0" err="1">
+                <a:latin typeface="VNI-Times" pitchFamily="2" charset="0"/>
+              </a:rPr>
+              <a:t>Danh</a:t>
+            </a:r>
+            <a:r>
+              <a:rPr lang="en-US" dirty="0">
+                <a:latin typeface="VNI-Times" pitchFamily="2" charset="0"/>
+              </a:rPr>
+              <a:t> </a:t>
+            </a:r>
+            <a:r>
+              <a:rPr lang="en-US" dirty="0" err="1">
+                <a:latin typeface="VNI-Times" pitchFamily="2" charset="0"/>
+              </a:rPr>
+              <a:t>Chuùa</a:t>
+            </a:r>
+            <a:r>
+              <a:rPr lang="en-US" dirty="0">
+                <a:latin typeface="VNI-Times" pitchFamily="2" charset="0"/>
+              </a:rPr>
+              <a:t> </a:t>
+            </a:r>
+            <a:r>
+              <a:rPr lang="en-US" dirty="0" err="1">
+                <a:latin typeface="VNI-Times" pitchFamily="2" charset="0"/>
+              </a:rPr>
+              <a:t>Hieån</a:t>
+            </a:r>
+            <a:r>
+              <a:rPr lang="en-US" dirty="0">
+                <a:latin typeface="VNI-Times" pitchFamily="2" charset="0"/>
+              </a:rPr>
+              <a:t> Vinh</a:t>
+            </a:r>
           </a:p>
         </p:txBody>
       </p:sp>
@@ -3495,21 +4149,6 @@
   <p:clrMapOvr>
     <a:masterClrMapping/>
   </p:clrMapOvr>
-  <mc:AlternateContent xmlns:mc="http://schemas.openxmlformats.org/markup-compatibility/2006" xmlns:p14="http://schemas.microsoft.com/office/powerpoint/2010/main">
-    <mc:Choice Requires="p14">
-      <p:transition p14:dur="0"/>
-    </mc:Choice>
-    <mc:Fallback xmlns="">
-      <p:transition/>
-    </mc:Fallback>
-  </mc:AlternateContent>
-  <p:timing>
-    <p:tnLst>
-      <p:par>
-        <p:cTn id="1" dur="indefinite" restart="never" nodeType="tmRoot"/>
-      </p:par>
-    </p:tnLst>
-  </p:timing>
 </p:sld>
 </file>
 
@@ -3641,10 +4280,83 @@
           </a:lstStyle>
           <a:p>
             <a:r>
-              <a:rPr lang="en-US" smtClean="0"/>
-              <a:t>TC 15 – Ngaøy Ngaøy Ngôïi Danh Chuùa Hieån Vinh</a:t>
-            </a:r>
-            <a:endParaRPr lang="en-US"/>
+              <a:rPr lang="en-US" dirty="0">
+                <a:latin typeface="VNI-Times" pitchFamily="2" charset="0"/>
+              </a:rPr>
+              <a:t>TC 15 – </a:t>
+            </a:r>
+            <a:r>
+              <a:rPr lang="en-US" dirty="0" err="1">
+                <a:latin typeface="VNI-Times" pitchFamily="2" charset="0"/>
+              </a:rPr>
+              <a:t>Ngaøy</a:t>
+            </a:r>
+            <a:r>
+              <a:rPr lang="en-US" dirty="0">
+                <a:latin typeface="VNI-Times" pitchFamily="2" charset="0"/>
+              </a:rPr>
+              <a:t> </a:t>
+            </a:r>
+            <a:r>
+              <a:rPr lang="en-US" dirty="0" err="1">
+                <a:latin typeface="VNI-Times" pitchFamily="2" charset="0"/>
+              </a:rPr>
+              <a:t>Ngaøy</a:t>
+            </a:r>
+            <a:r>
+              <a:rPr lang="en-US" dirty="0">
+                <a:latin typeface="VNI-Times" pitchFamily="2" charset="0"/>
+              </a:rPr>
+              <a:t> </a:t>
+            </a:r>
+            <a:r>
+              <a:rPr lang="en-US" dirty="0" err="1">
+                <a:latin typeface="VNI-Times" pitchFamily="2" charset="0"/>
+              </a:rPr>
+              <a:t>Ngôïi</a:t>
+            </a:r>
+            <a:r>
+              <a:rPr lang="en-US" dirty="0">
+                <a:latin typeface="VNI-Times" pitchFamily="2" charset="0"/>
+              </a:rPr>
+              <a:t> </a:t>
+            </a:r>
+            <a:r>
+              <a:rPr lang="en-US" dirty="0" err="1">
+                <a:latin typeface="VNI-Times" pitchFamily="2" charset="0"/>
+              </a:rPr>
+              <a:t>Danh</a:t>
+            </a:r>
+            <a:r>
+              <a:rPr lang="en-US" dirty="0">
+                <a:latin typeface="VNI-Times" pitchFamily="2" charset="0"/>
+              </a:rPr>
+              <a:t> </a:t>
+            </a:r>
+            <a:r>
+              <a:rPr lang="en-US" dirty="0" err="1">
+                <a:latin typeface="VNI-Times" pitchFamily="2" charset="0"/>
+              </a:rPr>
+              <a:t>Chuùa</a:t>
+            </a:r>
+            <a:r>
+              <a:rPr lang="en-US" dirty="0">
+                <a:latin typeface="VNI-Times" pitchFamily="2" charset="0"/>
+              </a:rPr>
+              <a:t> </a:t>
+            </a:r>
+            <a:r>
+              <a:rPr lang="en-US" dirty="0" err="1">
+                <a:latin typeface="VNI-Times" pitchFamily="2" charset="0"/>
+              </a:rPr>
+              <a:t>Hieån</a:t>
+            </a:r>
+            <a:r>
+              <a:rPr lang="en-US" dirty="0">
+                <a:latin typeface="VNI-Times" pitchFamily="2" charset="0"/>
+              </a:rPr>
+              <a:t> Vinh</a:t>
+            </a:r>
           </a:p>
         </p:txBody>
       </p:sp>
@@ -3658,21 +4370,6 @@
   <p:clrMapOvr>
     <a:masterClrMapping/>
   </p:clrMapOvr>
-  <mc:AlternateContent xmlns:mc="http://schemas.openxmlformats.org/markup-compatibility/2006" xmlns:p14="http://schemas.microsoft.com/office/powerpoint/2010/main">
-    <mc:Choice Requires="p14">
-      <p:transition p14:dur="0"/>
-    </mc:Choice>
-    <mc:Fallback xmlns="">
-      <p:transition/>
-    </mc:Fallback>
-  </mc:AlternateContent>
-  <p:timing>
-    <p:tnLst>
-      <p:par>
-        <p:cTn id="1" dur="indefinite" restart="never" nodeType="tmRoot"/>
-      </p:par>
-    </p:tnLst>
-  </p:timing>
 </p:sld>
 </file>
 

</xml_diff>